<commit_message>
Adding Software Flow Diagram
</commit_message>
<xml_diff>
--- a/Project_1/docs/Neathery_ENGI301_project_01_proposal.pptx
+++ b/Project_1/docs/Neathery_ENGI301_project_01_proposal.pptx
@@ -220,7 +220,7 @@
           <a:p>
             <a:fld id="{59041DB8-B66F-4DC8-A96E-33677E0F90FF}" type="datetimeFigureOut">
               <a:rPr lang="en-US" smtClean="0"/>
-              <a:t>2/12/2023</a:t>
+              <a:t>2/20/2023</a:t>
             </a:fld>
             <a:endParaRPr lang="en-US"/>
           </a:p>
@@ -385,7 +385,7 @@
           <a:p>
             <a:fld id="{DEB49C4A-65AC-492D-9701-81B46C3AD0E4}" type="datetimeFigureOut">
               <a:rPr lang="en-US" smtClean="0"/>
-              <a:t>2/12/2023</a:t>
+              <a:t>2/20/2023</a:t>
             </a:fld>
             <a:endParaRPr lang="en-US"/>
           </a:p>
@@ -2793,7 +2793,7 @@
           <a:p>
             <a:fld id="{384A29A4-78C8-47AB-BA06-22CB45938951}" type="datetime1">
               <a:rPr lang="en-US" smtClean="0"/>
-              <a:t>2/12/2023</a:t>
+              <a:t>2/20/2023</a:t>
             </a:fld>
             <a:endParaRPr lang="en-US"/>
           </a:p>
@@ -2988,7 +2988,7 @@
           <a:p>
             <a:fld id="{E1ED4ACF-2D82-46F2-A8E9-23963AA34E86}" type="datetime1">
               <a:rPr lang="en-US" smtClean="0"/>
-              <a:t>2/12/2023</a:t>
+              <a:t>2/20/2023</a:t>
             </a:fld>
             <a:endParaRPr lang="en-US"/>
           </a:p>
@@ -3182,7 +3182,7 @@
           <a:p>
             <a:fld id="{AE374B5B-21A0-4192-BF4C-38187F1A68D8}" type="datetime1">
               <a:rPr lang="en-US" smtClean="0"/>
-              <a:t>2/12/2023</a:t>
+              <a:t>2/20/2023</a:t>
             </a:fld>
             <a:endParaRPr lang="en-US"/>
           </a:p>
@@ -5523,7 +5523,7 @@
           <a:p>
             <a:fld id="{33B5CF7C-B333-48E1-A4A6-83A3C8B73AC0}" type="datetime1">
               <a:rPr lang="en-US" smtClean="0"/>
-              <a:t>2/12/2023</a:t>
+              <a:t>2/20/2023</a:t>
             </a:fld>
             <a:endParaRPr lang="en-US"/>
           </a:p>
@@ -5976,7 +5976,7 @@
           <a:p>
             <a:fld id="{AE320762-5CBF-4210-AB54-376B091119F8}" type="datetime1">
               <a:rPr lang="en-US" smtClean="0"/>
-              <a:t>2/12/2023</a:t>
+              <a:t>2/20/2023</a:t>
             </a:fld>
             <a:endParaRPr lang="en-US"/>
           </a:p>
@@ -6108,7 +6108,7 @@
           <a:p>
             <a:fld id="{7F0DB371-BF5F-4058-A212-1A908E4D2674}" type="datetime1">
               <a:rPr lang="en-US" smtClean="0"/>
-              <a:t>2/12/2023</a:t>
+              <a:t>2/20/2023</a:t>
             </a:fld>
             <a:endParaRPr lang="en-US"/>
           </a:p>
@@ -8041,7 +8041,7 @@
           <a:p>
             <a:fld id="{60A4083B-90AA-48CF-BAD5-00AA24D7F288}" type="datetime1">
               <a:rPr lang="en-US" smtClean="0"/>
-              <a:t>2/12/2023</a:t>
+              <a:t>2/20/2023</a:t>
             </a:fld>
             <a:endParaRPr lang="en-US"/>
           </a:p>
@@ -10300,7 +10300,7 @@
             <a:fld id="{F5BAF629-ECA2-4CF3-B790-9D9BDED98269}" type="datetime1">
               <a:rPr lang="en-US" smtClean="0"/>
               <a:pPr/>
-              <a:t>2/12/2023</a:t>
+              <a:t>2/20/2023</a:t>
             </a:fld>
             <a:endParaRPr lang="en-US"/>
           </a:p>
@@ -14595,7 +14595,7 @@
             <a:fld id="{B51B2453-8663-4C69-AF73-9FD7B1DEC5D0}" type="datetime1">
               <a:rPr lang="en-US" smtClean="0"/>
               <a:pPr/>
-              <a:t>2/12/2023</a:t>
+              <a:t>2/20/2023</a:t>
             </a:fld>
             <a:endParaRPr lang="en-US" dirty="0"/>
           </a:p>
@@ -16070,14 +16070,14 @@
             <p:ph idx="1"/>
             <p:extLst>
               <p:ext uri="{D42A27DB-BD31-4B8C-83A1-F6EECF244321}">
-                <p14:modId xmlns:p14="http://schemas.microsoft.com/office/powerpoint/2010/main" val="3072553311"/>
+                <p14:modId xmlns:p14="http://schemas.microsoft.com/office/powerpoint/2010/main" val="1927422249"/>
               </p:ext>
             </p:extLst>
           </p:nvPr>
         </p:nvGraphicFramePr>
         <p:xfrm>
           <a:off x="609600" y="1295400"/>
-          <a:ext cx="10972800" cy="4079240"/>
+          <a:ext cx="10972800" cy="3708400"/>
         </p:xfrm>
         <a:graphic>
           <a:graphicData uri="http://schemas.openxmlformats.org/drawingml/2006/table">
@@ -16161,9 +16161,12 @@
                     <a:lstStyle/>
                     <a:p>
                       <a:r>
-                        <a:rPr lang="en-US" dirty="0"/>
+                        <a:rPr lang="en-US" dirty="0">
+                          <a:hlinkClick r:id="rId2"/>
+                        </a:rPr>
                         <a:t>Sliding Potentiometer</a:t>
                       </a:r>
+                      <a:endParaRPr lang="en-US" dirty="0"/>
                     </a:p>
                   </a:txBody>
                   <a:tcPr/>
@@ -16207,9 +16210,12 @@
                     <a:lstStyle/>
                     <a:p>
                       <a:r>
-                        <a:rPr lang="en-US" dirty="0"/>
+                        <a:rPr lang="en-US" dirty="0">
+                          <a:hlinkClick r:id="rId3"/>
+                        </a:rPr>
                         <a:t>Toggle Switch with Cover</a:t>
                       </a:r>
+                      <a:endParaRPr lang="en-US" dirty="0"/>
                     </a:p>
                   </a:txBody>
                   <a:tcPr/>
@@ -16253,9 +16259,12 @@
                     <a:lstStyle/>
                     <a:p>
                       <a:r>
-                        <a:rPr lang="en-US" dirty="0"/>
+                        <a:rPr lang="en-US" dirty="0">
+                          <a:hlinkClick r:id="rId4"/>
+                        </a:rPr>
                         <a:t>Toggle Switch</a:t>
                       </a:r>
+                      <a:endParaRPr lang="en-US" dirty="0"/>
                     </a:p>
                   </a:txBody>
                   <a:tcPr/>
@@ -16267,7 +16276,7 @@
                     <a:p>
                       <a:r>
                         <a:rPr lang="en-US" dirty="0"/>
-                        <a:t>12</a:t>
+                        <a:t>13</a:t>
                       </a:r>
                     </a:p>
                   </a:txBody>
@@ -16299,9 +16308,12 @@
                     <a:lstStyle/>
                     <a:p>
                       <a:r>
-                        <a:rPr lang="en-US" dirty="0"/>
+                        <a:rPr lang="en-US" dirty="0">
+                          <a:hlinkClick r:id="rId5"/>
+                        </a:rPr>
                         <a:t>Rotary Potentiometer</a:t>
                       </a:r>
+                      <a:endParaRPr lang="en-US" dirty="0"/>
                     </a:p>
                   </a:txBody>
                   <a:tcPr/>
@@ -16345,8 +16357,14 @@
                     <a:lstStyle/>
                     <a:p>
                       <a:r>
+                        <a:rPr lang="en-US" dirty="0">
+                          <a:hlinkClick r:id="rId6"/>
+                        </a:rPr>
+                        <a:t>Aluminum Potentiometer knob</a:t>
+                      </a:r>
+                      <a:r>
                         <a:rPr lang="en-US" dirty="0"/>
-                        <a:t>Aluminum Potentiometer knob</a:t>
+                        <a:t> (1 gold &amp; one blue)</a:t>
                       </a:r>
                     </a:p>
                   </a:txBody>
@@ -16391,55 +16409,12 @@
                     <a:lstStyle/>
                     <a:p>
                       <a:r>
-                        <a:rPr lang="en-US" dirty="0"/>
-                        <a:t>Buttons</a:t>
-                      </a:r>
-                    </a:p>
-                  </a:txBody>
-                  <a:tcPr/>
-                </a:tc>
-                <a:tc>
-                  <a:txBody>
-                    <a:bodyPr/>
-                    <a:lstStyle/>
-                    <a:p>
-                      <a:r>
-                        <a:rPr lang="en-US" dirty="0"/>
-                        <a:t>3</a:t>
-                      </a:r>
-                    </a:p>
-                  </a:txBody>
-                  <a:tcPr/>
-                </a:tc>
-                <a:tc>
-                  <a:txBody>
-                    <a:bodyPr/>
-                    <a:lstStyle/>
-                    <a:p>
-                      <a:r>
-                        <a:rPr lang="en-US" dirty="0"/>
-                        <a:t>~$1 each?</a:t>
-                      </a:r>
-                    </a:p>
-                  </a:txBody>
-                  <a:tcPr/>
-                </a:tc>
-                <a:extLst>
-                  <a:ext uri="{0D108BD9-81ED-4DB2-BD59-A6C34878D82A}">
-                    <a16:rowId xmlns:a16="http://schemas.microsoft.com/office/drawing/2014/main" val="1364489299"/>
-                  </a:ext>
-                </a:extLst>
-              </a:tr>
-              <a:tr h="370840">
-                <a:tc>
-                  <a:txBody>
-                    <a:bodyPr/>
-                    <a:lstStyle/>
-                    <a:p>
-                      <a:r>
-                        <a:rPr lang="en-US" dirty="0"/>
+                        <a:rPr lang="en-US" dirty="0">
+                          <a:hlinkClick r:id="rId7"/>
+                        </a:rPr>
                         <a:t>Big Red Button</a:t>
                       </a:r>
+                      <a:endParaRPr lang="en-US" dirty="0"/>
                     </a:p>
                   </a:txBody>
                   <a:tcPr/>
@@ -16484,7 +16459,7 @@
                     <a:p>
                       <a:r>
                         <a:rPr lang="en-US" dirty="0"/>
-                        <a:t>Character Displays</a:t>
+                        <a:t>Character Display</a:t>
                       </a:r>
                     </a:p>
                   </a:txBody>
@@ -16530,7 +16505,27 @@
                     <a:p>
                       <a:r>
                         <a:rPr lang="en-US" dirty="0"/>
-                        <a:t>LED Bars</a:t>
+                        <a:t>LED Bars (</a:t>
+                      </a:r>
+                      <a:r>
+                        <a:rPr lang="en-US" dirty="0">
+                          <a:hlinkClick r:id="rId8"/>
+                        </a:rPr>
+                        <a:t>Orange</a:t>
+                      </a:r>
+                      <a:r>
+                        <a:rPr lang="en-US" dirty="0"/>
+                        <a:t> &amp; </a:t>
+                      </a:r>
+                      <a:r>
+                        <a:rPr lang="en-US" dirty="0">
+                          <a:hlinkClick r:id="rId9"/>
+                        </a:rPr>
+                        <a:t>Blue</a:t>
+                      </a:r>
+                      <a:r>
+                        <a:rPr lang="en-US" dirty="0"/>
+                        <a:t>)</a:t>
                       </a:r>
                     </a:p>
                   </a:txBody>
@@ -16556,7 +16551,7 @@
                     <a:p>
                       <a:r>
                         <a:rPr lang="en-US" dirty="0"/>
-                        <a:t>$2 each</a:t>
+                        <a:t>$1.75 each</a:t>
                       </a:r>
                     </a:p>
                   </a:txBody>
@@ -16575,9 +16570,12 @@
                     <a:lstStyle/>
                     <a:p>
                       <a:r>
-                        <a:rPr lang="en-US" dirty="0"/>
+                        <a:rPr lang="en-US" dirty="0">
+                          <a:hlinkClick r:id="rId10"/>
+                        </a:rPr>
                         <a:t>2 Axis Joystick</a:t>
                       </a:r>
+                      <a:endParaRPr lang="en-US" dirty="0"/>
                     </a:p>
                   </a:txBody>
                   <a:tcPr/>
@@ -16602,7 +16600,7 @@
                     <a:p>
                       <a:r>
                         <a:rPr lang="en-US" dirty="0"/>
-                        <a:t>$6 each</a:t>
+                        <a:t>$5.95 each</a:t>
                       </a:r>
                     </a:p>
                   </a:txBody>

</xml_diff>